<commit_message>
Addresses diagram requests #51
</commit_message>
<xml_diff>
--- a/diagrams/diagrams.pptx
+++ b/diagrams/diagrams.pptx
@@ -210,7 +210,7 @@
           <a:p>
             <a:fld id="{F7C6D7A8-37AF-4A0B-A72B-1C12B9FE4D41}" type="datetimeFigureOut">
               <a:rPr lang="en-US" smtClean="0"/>
-              <a:t>5/22/21</a:t>
+              <a:t>6/10/21</a:t>
             </a:fld>
             <a:endParaRPr lang="en-US"/>
           </a:p>
@@ -543,7 +543,7 @@
             <a:fld id="{1D8BD707-D9CF-40AE-B4C6-C98DA3205C09}" type="datetimeFigureOut">
               <a:rPr lang="en-US" smtClean="0"/>
               <a:pPr/>
-              <a:t>5/22/21</a:t>
+              <a:t>6/10/21</a:t>
             </a:fld>
             <a:endParaRPr lang="en-US"/>
           </a:p>
@@ -718,7 +718,7 @@
             <a:fld id="{1D8BD707-D9CF-40AE-B4C6-C98DA3205C09}" type="datetimeFigureOut">
               <a:rPr lang="en-US" smtClean="0"/>
               <a:pPr/>
-              <a:t>5/22/21</a:t>
+              <a:t>6/10/21</a:t>
             </a:fld>
             <a:endParaRPr lang="en-US"/>
           </a:p>
@@ -995,7 +995,7 @@
             <a:fld id="{1D8BD707-D9CF-40AE-B4C6-C98DA3205C09}" type="datetimeFigureOut">
               <a:rPr lang="en-US" smtClean="0"/>
               <a:pPr/>
-              <a:t>5/22/21</a:t>
+              <a:t>6/10/21</a:t>
             </a:fld>
             <a:endParaRPr lang="en-US"/>
           </a:p>
@@ -1249,7 +1249,7 @@
             <a:fld id="{1D8BD707-D9CF-40AE-B4C6-C98DA3205C09}" type="datetimeFigureOut">
               <a:rPr lang="en-US" smtClean="0"/>
               <a:pPr/>
-              <a:t>5/22/21</a:t>
+              <a:t>6/10/21</a:t>
             </a:fld>
             <a:endParaRPr lang="en-US"/>
           </a:p>
@@ -1419,7 +1419,7 @@
             <a:fld id="{1D8BD707-D9CF-40AE-B4C6-C98DA3205C09}" type="datetimeFigureOut">
               <a:rPr lang="en-US" smtClean="0"/>
               <a:pPr/>
-              <a:t>5/22/21</a:t>
+              <a:t>6/10/21</a:t>
             </a:fld>
             <a:endParaRPr lang="en-US"/>
           </a:p>
@@ -1599,7 +1599,7 @@
             <a:fld id="{1D8BD707-D9CF-40AE-B4C6-C98DA3205C09}" type="datetimeFigureOut">
               <a:rPr lang="en-US" smtClean="0"/>
               <a:pPr/>
-              <a:t>5/22/21</a:t>
+              <a:t>6/10/21</a:t>
             </a:fld>
             <a:endParaRPr lang="en-US"/>
           </a:p>
@@ -1790,7 +1790,7 @@
           <a:p>
             <a:fld id="{68B6C288-4797-4207-92F3-FCA05817CF50}" type="datetimeFigureOut">
               <a:rPr lang="en-US" smtClean="0"/>
-              <a:t>5/22/21</a:t>
+              <a:t>6/10/21</a:t>
             </a:fld>
             <a:endParaRPr lang="en-US"/>
           </a:p>
@@ -2036,7 +2036,7 @@
             <a:fld id="{1D8BD707-D9CF-40AE-B4C6-C98DA3205C09}" type="datetimeFigureOut">
               <a:rPr lang="en-US" smtClean="0"/>
               <a:pPr/>
-              <a:t>5/22/21</a:t>
+              <a:t>6/10/21</a:t>
             </a:fld>
             <a:endParaRPr lang="en-US"/>
           </a:p>
@@ -2206,7 +2206,7 @@
             <a:fld id="{1D8BD707-D9CF-40AE-B4C6-C98DA3205C09}" type="datetimeFigureOut">
               <a:rPr lang="en-US" smtClean="0"/>
               <a:pPr/>
-              <a:t>5/22/21</a:t>
+              <a:t>6/10/21</a:t>
             </a:fld>
             <a:endParaRPr lang="en-US"/>
           </a:p>
@@ -2461,7 +2461,7 @@
             <a:fld id="{1D8BD707-D9CF-40AE-B4C6-C98DA3205C09}" type="datetimeFigureOut">
               <a:rPr lang="en-US" smtClean="0"/>
               <a:pPr/>
-              <a:t>5/22/21</a:t>
+              <a:t>6/10/21</a:t>
             </a:fld>
             <a:endParaRPr lang="en-US"/>
           </a:p>
@@ -2712,7 +2712,7 @@
             <a:fld id="{1D8BD707-D9CF-40AE-B4C6-C98DA3205C09}" type="datetimeFigureOut">
               <a:rPr lang="en-US" smtClean="0"/>
               <a:pPr/>
-              <a:t>5/22/21</a:t>
+              <a:t>6/10/21</a:t>
             </a:fld>
             <a:endParaRPr lang="en-US"/>
           </a:p>
@@ -2963,7 +2963,7 @@
             <a:fld id="{1D8BD707-D9CF-40AE-B4C6-C98DA3205C09}" type="datetimeFigureOut">
               <a:rPr lang="en-US" smtClean="0"/>
               <a:pPr/>
-              <a:t>5/22/21</a:t>
+              <a:t>6/10/21</a:t>
             </a:fld>
             <a:endParaRPr lang="en-US"/>
           </a:p>
@@ -3250,7 +3250,7 @@
             <a:fld id="{1D8BD707-D9CF-40AE-B4C6-C98DA3205C09}" type="datetimeFigureOut">
               <a:rPr lang="en-US" smtClean="0"/>
               <a:pPr/>
-              <a:t>5/22/21</a:t>
+              <a:t>6/10/21</a:t>
             </a:fld>
             <a:endParaRPr lang="en-US"/>
           </a:p>
@@ -3671,7 +3671,7 @@
             <a:fld id="{1D8BD707-D9CF-40AE-B4C6-C98DA3205C09}" type="datetimeFigureOut">
               <a:rPr lang="en-US" smtClean="0"/>
               <a:pPr/>
-              <a:t>5/22/21</a:t>
+              <a:t>6/10/21</a:t>
             </a:fld>
             <a:endParaRPr lang="en-US"/>
           </a:p>
@@ -3790,7 +3790,7 @@
             <a:fld id="{1D8BD707-D9CF-40AE-B4C6-C98DA3205C09}" type="datetimeFigureOut">
               <a:rPr lang="en-US" smtClean="0"/>
               <a:pPr/>
-              <a:t>5/22/21</a:t>
+              <a:t>6/10/21</a:t>
             </a:fld>
             <a:endParaRPr lang="en-US"/>
           </a:p>
@@ -4003,7 +4003,7 @@
             <a:fld id="{1D8BD707-D9CF-40AE-B4C6-C98DA3205C09}" type="datetimeFigureOut">
               <a:rPr lang="en-US" smtClean="0"/>
               <a:pPr/>
-              <a:t>5/22/21</a:t>
+              <a:t>6/10/21</a:t>
             </a:fld>
             <a:endParaRPr lang="en-US"/>
           </a:p>
@@ -4402,7 +4402,7 @@
         </p:nvSpPr>
         <p:spPr>
           <a:xfrm>
-            <a:off x="2743200" y="2152650"/>
+            <a:off x="2743200" y="2519749"/>
             <a:ext cx="2514600" cy="228600"/>
           </a:xfrm>
           <a:prstGeom prst="rect">
@@ -4456,7 +4456,7 @@
         </p:nvSpPr>
         <p:spPr>
           <a:xfrm>
-            <a:off x="2743200" y="2762250"/>
+            <a:off x="2743200" y="3129349"/>
             <a:ext cx="1676400" cy="228600"/>
           </a:xfrm>
           <a:prstGeom prst="rect">
@@ -4510,7 +4510,7 @@
         </p:nvSpPr>
         <p:spPr>
           <a:xfrm>
-            <a:off x="2743200" y="2457450"/>
+            <a:off x="2743200" y="2824549"/>
             <a:ext cx="2514600" cy="228600"/>
           </a:xfrm>
           <a:prstGeom prst="rect">
@@ -4564,8 +4564,8 @@
         </p:nvSpPr>
         <p:spPr>
           <a:xfrm>
-            <a:off x="5257800" y="2128451"/>
-            <a:ext cx="1828800" cy="261610"/>
+            <a:off x="5257799" y="2495550"/>
+            <a:ext cx="1600200" cy="261610"/>
           </a:xfrm>
           <a:prstGeom prst="rect">
             <a:avLst/>
@@ -4605,8 +4605,8 @@
         </p:nvSpPr>
         <p:spPr>
           <a:xfrm>
-            <a:off x="5257800" y="2433251"/>
-            <a:ext cx="2305878" cy="261610"/>
+            <a:off x="5257799" y="2800350"/>
+            <a:ext cx="1524000" cy="261610"/>
           </a:xfrm>
           <a:prstGeom prst="rect">
             <a:avLst/>
@@ -4646,8 +4646,8 @@
         </p:nvSpPr>
         <p:spPr>
           <a:xfrm>
-            <a:off x="5257799" y="2738051"/>
-            <a:ext cx="1921556" cy="261610"/>
+            <a:off x="5257799" y="3105150"/>
+            <a:ext cx="1676401" cy="261610"/>
           </a:xfrm>
           <a:prstGeom prst="rect">
             <a:avLst/>
@@ -4688,7 +4688,7 @@
         <p:spPr>
           <a:xfrm>
             <a:off x="1905000" y="742950"/>
-            <a:ext cx="5029200" cy="2590800"/>
+            <a:ext cx="5029200" cy="1524000"/>
           </a:xfrm>
           <a:prstGeom prst="foldedCorner">
             <a:avLst>
@@ -4734,7 +4734,7 @@
         </p:nvSpPr>
         <p:spPr>
           <a:xfrm rot="16200000">
-            <a:off x="742266" y="1784064"/>
+            <a:off x="711488" y="1174463"/>
             <a:ext cx="1447802" cy="584775"/>
           </a:xfrm>
           <a:prstGeom prst="rect">
@@ -4763,107 +4763,41 @@
           </a:p>
         </p:txBody>
       </p:sp>
-      <p:grpSp>
-        <p:nvGrpSpPr>
-          <p:cNvPr id="3" name="Group 2">
+      <p:sp>
+        <p:nvSpPr>
+          <p:cNvPr id="17" name="TextBox 16">
             <a:extLst>
               <a:ext uri="{FF2B5EF4-FFF2-40B4-BE49-F238E27FC236}">
-                <a16:creationId xmlns:a16="http://schemas.microsoft.com/office/drawing/2014/main" id="{F5888CE4-7386-0842-9BA3-835D862C01F4}"/>
+                <a16:creationId xmlns:a16="http://schemas.microsoft.com/office/drawing/2014/main" id="{D29409A5-EB70-4B0D-9471-110AA583501A}"/>
               </a:ext>
             </a:extLst>
           </p:cNvPr>
-          <p:cNvGrpSpPr/>
+          <p:cNvSpPr txBox="1"/>
           <p:nvPr/>
-        </p:nvGrpSpPr>
-        <p:grpSpPr>
+        </p:nvSpPr>
+        <p:spPr>
           <a:xfrm>
-            <a:off x="2743200" y="895350"/>
-            <a:ext cx="1676400" cy="290565"/>
-            <a:chOff x="2743200" y="1828929"/>
-            <a:chExt cx="1676400" cy="290565"/>
-          </a:xfrm>
-        </p:grpSpPr>
-        <p:sp>
-          <p:nvSpPr>
-            <p:cNvPr id="16" name="Left Bracket 15">
-              <a:extLst>
-                <a:ext uri="{FF2B5EF4-FFF2-40B4-BE49-F238E27FC236}">
-                  <a16:creationId xmlns:a16="http://schemas.microsoft.com/office/drawing/2014/main" id="{798A5C2B-7A5F-43EC-B992-834FE188920E}"/>
-                </a:ext>
-              </a:extLst>
-            </p:cNvPr>
-            <p:cNvSpPr/>
-            <p:nvPr/>
-          </p:nvSpPr>
-          <p:spPr>
-            <a:xfrm rot="5400000">
-              <a:off x="3552444" y="1252339"/>
-              <a:ext cx="57911" cy="1676400"/>
-            </a:xfrm>
-            <a:prstGeom prst="leftBracket">
-              <a:avLst/>
-            </a:prstGeom>
-            <a:ln w="12700"/>
-          </p:spPr>
-          <p:style>
-            <a:lnRef idx="1">
-              <a:schemeClr val="dk1"/>
-            </a:lnRef>
-            <a:fillRef idx="0">
-              <a:schemeClr val="dk1"/>
-            </a:fillRef>
-            <a:effectRef idx="0">
-              <a:schemeClr val="dk1"/>
-            </a:effectRef>
-            <a:fontRef idx="minor">
-              <a:schemeClr val="tx1"/>
-            </a:fontRef>
-          </p:style>
-          <p:txBody>
-            <a:bodyPr rtlCol="0" anchor="ctr"/>
-            <a:lstStyle/>
-            <a:p>
-              <a:pPr algn="ctr"/>
-              <a:endParaRPr lang="en-GB"/>
-            </a:p>
-          </p:txBody>
-        </p:sp>
-        <p:sp>
-          <p:nvSpPr>
-            <p:cNvPr id="17" name="TextBox 16">
-              <a:extLst>
-                <a:ext uri="{FF2B5EF4-FFF2-40B4-BE49-F238E27FC236}">
-                  <a16:creationId xmlns:a16="http://schemas.microsoft.com/office/drawing/2014/main" id="{D29409A5-EB70-4B0D-9471-110AA583501A}"/>
-                </a:ext>
-              </a:extLst>
-            </p:cNvPr>
-            <p:cNvSpPr txBox="1"/>
-            <p:nvPr/>
-          </p:nvSpPr>
-          <p:spPr>
-            <a:xfrm>
-              <a:off x="3037019" y="1828929"/>
-              <a:ext cx="1088760" cy="261610"/>
-            </a:xfrm>
-            <a:prstGeom prst="rect">
-              <a:avLst/>
-            </a:prstGeom>
-            <a:noFill/>
-          </p:spPr>
-          <p:txBody>
-            <a:bodyPr wrap="none" rtlCol="0">
-              <a:spAutoFit/>
-            </a:bodyPr>
-            <a:lstStyle/>
-            <a:p>
-              <a:r>
-                <a:rPr lang="en-GB" sz="1100" dirty="0"/>
-                <a:t>Playable Region</a:t>
-              </a:r>
-            </a:p>
-          </p:txBody>
-        </p:sp>
-      </p:grpSp>
+            <a:off x="3037020" y="3486150"/>
+            <a:ext cx="1088760" cy="261610"/>
+          </a:xfrm>
+          <a:prstGeom prst="rect">
+            <a:avLst/>
+          </a:prstGeom>
+          <a:noFill/>
+        </p:spPr>
+        <p:txBody>
+          <a:bodyPr wrap="none" rtlCol="0">
+            <a:spAutoFit/>
+          </a:bodyPr>
+          <a:lstStyle/>
+          <a:p>
+            <a:r>
+              <a:rPr lang="en-GB" sz="1100" dirty="0"/>
+              <a:t>Playable Region</a:t>
+            </a:r>
+          </a:p>
+        </p:txBody>
+      </p:sp>
       <p:sp>
         <p:nvSpPr>
           <p:cNvPr id="18" name="TextBox 17">
@@ -5177,21 +5111,20 @@
         </p:nvCxnSpPr>
         <p:spPr>
           <a:xfrm rot="10800000">
-            <a:off x="2743200" y="1948250"/>
-            <a:ext cx="12700" cy="928301"/>
+            <a:off x="2743200" y="1948249"/>
+            <a:ext cx="12700" cy="1295400"/>
           </a:xfrm>
           <a:prstGeom prst="bentConnector3">
             <a:avLst>
-              <a:gd name="adj1" fmla="val 1602732"/>
+              <a:gd name="adj1" fmla="val 1800000"/>
             </a:avLst>
           </a:prstGeom>
           <a:ln>
             <a:solidFill>
-              <a:schemeClr val="accent6">
-                <a:lumMod val="75000"/>
-              </a:schemeClr>
+              <a:schemeClr val="tx1"/>
             </a:solidFill>
-            <a:tailEnd type="triangle"/>
+            <a:headEnd type="triangle"/>
+            <a:tailEnd type="none"/>
           </a:ln>
         </p:spPr>
         <p:style>
@@ -5226,19 +5159,20 @@
         </p:nvCxnSpPr>
         <p:spPr>
           <a:xfrm rot="10800000">
-            <a:off x="2743200" y="1643450"/>
-            <a:ext cx="12700" cy="928301"/>
+            <a:off x="2743200" y="1643449"/>
+            <a:ext cx="12700" cy="1295400"/>
           </a:xfrm>
           <a:prstGeom prst="bentConnector3">
             <a:avLst>
-              <a:gd name="adj1" fmla="val 2983567"/>
+              <a:gd name="adj1" fmla="val 1800000"/>
             </a:avLst>
           </a:prstGeom>
           <a:ln>
             <a:solidFill>
-              <a:srgbClr val="92D050"/>
+              <a:schemeClr val="tx1"/>
             </a:solidFill>
-            <a:tailEnd type="triangle"/>
+            <a:headEnd type="triangle"/>
+            <a:tailEnd type="none"/>
           </a:ln>
         </p:spPr>
         <p:style>
@@ -5273,15 +5207,147 @@
         </p:nvCxnSpPr>
         <p:spPr>
           <a:xfrm rot="10800000">
-            <a:off x="2743200" y="1362850"/>
-            <a:ext cx="12700" cy="904101"/>
+            <a:off x="2743200" y="1362849"/>
+            <a:ext cx="12700" cy="1271200"/>
           </a:xfrm>
           <a:prstGeom prst="bentConnector3">
             <a:avLst>
-              <a:gd name="adj1" fmla="val 4660276"/>
+              <a:gd name="adj1" fmla="val 1800000"/>
             </a:avLst>
           </a:prstGeom>
           <a:ln>
+            <a:solidFill>
+              <a:schemeClr val="tx1"/>
+            </a:solidFill>
+            <a:headEnd type="triangle"/>
+            <a:tailEnd type="none"/>
+          </a:ln>
+        </p:spPr>
+        <p:style>
+          <a:lnRef idx="1">
+            <a:schemeClr val="accent1"/>
+          </a:lnRef>
+          <a:fillRef idx="0">
+            <a:schemeClr val="accent1"/>
+          </a:fillRef>
+          <a:effectRef idx="0">
+            <a:schemeClr val="accent1"/>
+          </a:effectRef>
+          <a:fontRef idx="minor">
+            <a:schemeClr val="tx1"/>
+          </a:fontRef>
+        </p:style>
+      </p:cxnSp>
+      <p:cxnSp>
+        <p:nvCxnSpPr>
+          <p:cNvPr id="4" name="Straight Connector 3">
+            <a:extLst>
+              <a:ext uri="{FF2B5EF4-FFF2-40B4-BE49-F238E27FC236}">
+                <a16:creationId xmlns:a16="http://schemas.microsoft.com/office/drawing/2014/main" id="{18A2903B-F9C9-DE45-8F7A-F3DE00E0B511}"/>
+              </a:ext>
+            </a:extLst>
+          </p:cNvPr>
+          <p:cNvCxnSpPr>
+            <a:cxnSpLocks/>
+          </p:cNvCxnSpPr>
+          <p:nvPr/>
+        </p:nvCxnSpPr>
+        <p:spPr>
+          <a:xfrm>
+            <a:off x="2743200" y="2343150"/>
+            <a:ext cx="0" cy="1219200"/>
+          </a:xfrm>
+          <a:prstGeom prst="line">
+            <a:avLst/>
+          </a:prstGeom>
+          <a:ln w="25400">
+            <a:solidFill>
+              <a:schemeClr val="accent2"/>
+            </a:solidFill>
+          </a:ln>
+        </p:spPr>
+        <p:style>
+          <a:lnRef idx="1">
+            <a:schemeClr val="accent1"/>
+          </a:lnRef>
+          <a:fillRef idx="0">
+            <a:schemeClr val="accent1"/>
+          </a:fillRef>
+          <a:effectRef idx="0">
+            <a:schemeClr val="accent1"/>
+          </a:effectRef>
+          <a:fontRef idx="minor">
+            <a:schemeClr val="tx1"/>
+          </a:fontRef>
+        </p:style>
+      </p:cxnSp>
+      <p:cxnSp>
+        <p:nvCxnSpPr>
+          <p:cNvPr id="27" name="Straight Connector 26">
+            <a:extLst>
+              <a:ext uri="{FF2B5EF4-FFF2-40B4-BE49-F238E27FC236}">
+                <a16:creationId xmlns:a16="http://schemas.microsoft.com/office/drawing/2014/main" id="{264F08F1-D268-3D4C-91E4-F3D8F346153C}"/>
+              </a:ext>
+            </a:extLst>
+          </p:cNvPr>
+          <p:cNvCxnSpPr>
+            <a:cxnSpLocks/>
+          </p:cNvCxnSpPr>
+          <p:nvPr/>
+        </p:nvCxnSpPr>
+        <p:spPr>
+          <a:xfrm>
+            <a:off x="4419600" y="2343150"/>
+            <a:ext cx="0" cy="1219200"/>
+          </a:xfrm>
+          <a:prstGeom prst="line">
+            <a:avLst/>
+          </a:prstGeom>
+          <a:ln w="25400">
+            <a:solidFill>
+              <a:schemeClr val="accent2"/>
+            </a:solidFill>
+          </a:ln>
+        </p:spPr>
+        <p:style>
+          <a:lnRef idx="1">
+            <a:schemeClr val="accent1"/>
+          </a:lnRef>
+          <a:fillRef idx="0">
+            <a:schemeClr val="accent1"/>
+          </a:fillRef>
+          <a:effectRef idx="0">
+            <a:schemeClr val="accent1"/>
+          </a:effectRef>
+          <a:fontRef idx="minor">
+            <a:schemeClr val="tx1"/>
+          </a:fontRef>
+        </p:style>
+      </p:cxnSp>
+      <p:cxnSp>
+        <p:nvCxnSpPr>
+          <p:cNvPr id="25" name="Straight Arrow Connector 24">
+            <a:extLst>
+              <a:ext uri="{FF2B5EF4-FFF2-40B4-BE49-F238E27FC236}">
+                <a16:creationId xmlns:a16="http://schemas.microsoft.com/office/drawing/2014/main" id="{2198AB5F-8DF4-6145-A742-0B9D0C78FE35}"/>
+              </a:ext>
+            </a:extLst>
+          </p:cNvPr>
+          <p:cNvCxnSpPr>
+            <a:cxnSpLocks/>
+          </p:cNvCxnSpPr>
+          <p:nvPr/>
+        </p:nvCxnSpPr>
+        <p:spPr>
+          <a:xfrm>
+            <a:off x="2743200" y="3486150"/>
+            <a:ext cx="1676400" cy="0"/>
+          </a:xfrm>
+          <a:prstGeom prst="straightConnector1">
+            <a:avLst/>
+          </a:prstGeom>
+          <a:ln>
+            <a:headEnd type="triangle"/>
             <a:tailEnd type="triangle"/>
           </a:ln>
         </p:spPr>

</xml_diff>